<commit_message>
Final version of the project
</commit_message>
<xml_diff>
--- a/design/Architecture.pptx
+++ b/design/Architecture.pptx
@@ -111,6 +111,11 @@
       </a:defRPr>
     </a:lvl9pPr>
   </p:defaultTextStyle>
+  <p:extLst>
+    <p:ext uri="{EFAFB233-063F-42B5-8137-9DF3F51BA10A}">
+      <p15:sldGuideLst xmlns:p15="http://schemas.microsoft.com/office/powerpoint/2012/main"/>
+    </p:ext>
+  </p:extLst>
 </p:presentation>
 </file>
 
@@ -263,7 +268,7 @@
           <a:p>
             <a:fld id="{DABF6416-574A-46AE-9940-4D3341E22F91}" type="datetimeFigureOut">
               <a:rPr lang="en-SE" smtClean="0"/>
-              <a:t>2022-07-23</a:t>
+              <a:t>2022-07-28</a:t>
             </a:fld>
             <a:endParaRPr lang="en-SE"/>
           </a:p>
@@ -463,7 +468,7 @@
           <a:p>
             <a:fld id="{DABF6416-574A-46AE-9940-4D3341E22F91}" type="datetimeFigureOut">
               <a:rPr lang="en-SE" smtClean="0"/>
-              <a:t>2022-07-23</a:t>
+              <a:t>2022-07-28</a:t>
             </a:fld>
             <a:endParaRPr lang="en-SE"/>
           </a:p>
@@ -673,7 +678,7 @@
           <a:p>
             <a:fld id="{DABF6416-574A-46AE-9940-4D3341E22F91}" type="datetimeFigureOut">
               <a:rPr lang="en-SE" smtClean="0"/>
-              <a:t>2022-07-23</a:t>
+              <a:t>2022-07-28</a:t>
             </a:fld>
             <a:endParaRPr lang="en-SE"/>
           </a:p>
@@ -873,7 +878,7 @@
           <a:p>
             <a:fld id="{DABF6416-574A-46AE-9940-4D3341E22F91}" type="datetimeFigureOut">
               <a:rPr lang="en-SE" smtClean="0"/>
-              <a:t>2022-07-23</a:t>
+              <a:t>2022-07-28</a:t>
             </a:fld>
             <a:endParaRPr lang="en-SE"/>
           </a:p>
@@ -1149,7 +1154,7 @@
           <a:p>
             <a:fld id="{DABF6416-574A-46AE-9940-4D3341E22F91}" type="datetimeFigureOut">
               <a:rPr lang="en-SE" smtClean="0"/>
-              <a:t>2022-07-23</a:t>
+              <a:t>2022-07-28</a:t>
             </a:fld>
             <a:endParaRPr lang="en-SE"/>
           </a:p>
@@ -1417,7 +1422,7 @@
           <a:p>
             <a:fld id="{DABF6416-574A-46AE-9940-4D3341E22F91}" type="datetimeFigureOut">
               <a:rPr lang="en-SE" smtClean="0"/>
-              <a:t>2022-07-23</a:t>
+              <a:t>2022-07-28</a:t>
             </a:fld>
             <a:endParaRPr lang="en-SE"/>
           </a:p>
@@ -1832,7 +1837,7 @@
           <a:p>
             <a:fld id="{DABF6416-574A-46AE-9940-4D3341E22F91}" type="datetimeFigureOut">
               <a:rPr lang="en-SE" smtClean="0"/>
-              <a:t>2022-07-23</a:t>
+              <a:t>2022-07-28</a:t>
             </a:fld>
             <a:endParaRPr lang="en-SE"/>
           </a:p>
@@ -1974,7 +1979,7 @@
           <a:p>
             <a:fld id="{DABF6416-574A-46AE-9940-4D3341E22F91}" type="datetimeFigureOut">
               <a:rPr lang="en-SE" smtClean="0"/>
-              <a:t>2022-07-23</a:t>
+              <a:t>2022-07-28</a:t>
             </a:fld>
             <a:endParaRPr lang="en-SE"/>
           </a:p>
@@ -2087,7 +2092,7 @@
           <a:p>
             <a:fld id="{DABF6416-574A-46AE-9940-4D3341E22F91}" type="datetimeFigureOut">
               <a:rPr lang="en-SE" smtClean="0"/>
-              <a:t>2022-07-23</a:t>
+              <a:t>2022-07-28</a:t>
             </a:fld>
             <a:endParaRPr lang="en-SE"/>
           </a:p>
@@ -2400,7 +2405,7 @@
           <a:p>
             <a:fld id="{DABF6416-574A-46AE-9940-4D3341E22F91}" type="datetimeFigureOut">
               <a:rPr lang="en-SE" smtClean="0"/>
-              <a:t>2022-07-23</a:t>
+              <a:t>2022-07-28</a:t>
             </a:fld>
             <a:endParaRPr lang="en-SE"/>
           </a:p>
@@ -2689,7 +2694,7 @@
           <a:p>
             <a:fld id="{DABF6416-574A-46AE-9940-4D3341E22F91}" type="datetimeFigureOut">
               <a:rPr lang="en-SE" smtClean="0"/>
-              <a:t>2022-07-23</a:t>
+              <a:t>2022-07-28</a:t>
             </a:fld>
             <a:endParaRPr lang="en-SE"/>
           </a:p>
@@ -2932,7 +2937,7 @@
           <a:p>
             <a:fld id="{DABF6416-574A-46AE-9940-4D3341E22F91}" type="datetimeFigureOut">
               <a:rPr lang="en-SE" smtClean="0"/>
-              <a:t>2022-07-23</a:t>
+              <a:t>2022-07-28</a:t>
             </a:fld>
             <a:endParaRPr lang="en-SE"/>
           </a:p>
@@ -3450,13 +3455,13 @@
   <p:clrMapOvr>
     <a:masterClrMapping/>
   </p:clrMapOvr>
-  <mc:AlternateContent xmlns:mc="http://schemas.openxmlformats.org/markup-compatibility/2006">
-    <mc:Choice xmlns:p159="http://schemas.microsoft.com/office/powerpoint/2015/09/main" Requires="p159">
+  <mc:AlternateContent xmlns:mc="http://schemas.openxmlformats.org/markup-compatibility/2006" xmlns:p159="http://schemas.microsoft.com/office/powerpoint/2015/09/main">
+    <mc:Choice Requires="p159">
       <p:transition xmlns:p14="http://schemas.microsoft.com/office/powerpoint/2010/main" spd="slow" p14:dur="2000">
         <p159:morph option="byObject"/>
       </p:transition>
     </mc:Choice>
-    <mc:Fallback>
+    <mc:Fallback xmlns="">
       <p:transition spd="slow">
         <p:fade/>
       </p:transition>
@@ -3583,13 +3588,13 @@
   <p:clrMapOvr>
     <a:masterClrMapping/>
   </p:clrMapOvr>
-  <mc:AlternateContent xmlns:mc="http://schemas.openxmlformats.org/markup-compatibility/2006">
-    <mc:Choice xmlns:p159="http://schemas.microsoft.com/office/powerpoint/2015/09/main" Requires="p159">
+  <mc:AlternateContent xmlns:mc="http://schemas.openxmlformats.org/markup-compatibility/2006" xmlns:p159="http://schemas.microsoft.com/office/powerpoint/2015/09/main">
+    <mc:Choice Requires="p159">
       <p:transition xmlns:p14="http://schemas.microsoft.com/office/powerpoint/2010/main" spd="slow" p14:dur="2000">
         <p159:morph option="byObject"/>
       </p:transition>
     </mc:Choice>
-    <mc:Fallback>
+    <mc:Fallback xmlns="">
       <p:transition spd="slow">
         <p:fade/>
       </p:transition>
@@ -3716,13 +3721,13 @@
   <p:clrMapOvr>
     <a:masterClrMapping/>
   </p:clrMapOvr>
-  <mc:AlternateContent xmlns:mc="http://schemas.openxmlformats.org/markup-compatibility/2006">
-    <mc:Choice xmlns:p159="http://schemas.microsoft.com/office/powerpoint/2015/09/main" Requires="p159">
+  <mc:AlternateContent xmlns:mc="http://schemas.openxmlformats.org/markup-compatibility/2006" xmlns:p159="http://schemas.microsoft.com/office/powerpoint/2015/09/main">
+    <mc:Choice Requires="p159">
       <p:transition xmlns:p14="http://schemas.microsoft.com/office/powerpoint/2010/main" spd="slow" p14:dur="2000">
         <p159:morph option="byObject"/>
       </p:transition>
     </mc:Choice>
-    <mc:Fallback>
+    <mc:Fallback xmlns="">
       <p:transition spd="slow">
         <p:fade/>
       </p:transition>
@@ -3849,13 +3854,13 @@
   <p:clrMapOvr>
     <a:masterClrMapping/>
   </p:clrMapOvr>
-  <mc:AlternateContent xmlns:mc="http://schemas.openxmlformats.org/markup-compatibility/2006">
-    <mc:Choice xmlns:p159="http://schemas.microsoft.com/office/powerpoint/2015/09/main" Requires="p159">
+  <mc:AlternateContent xmlns:mc="http://schemas.openxmlformats.org/markup-compatibility/2006" xmlns:p159="http://schemas.microsoft.com/office/powerpoint/2015/09/main">
+    <mc:Choice Requires="p159">
       <p:transition xmlns:p14="http://schemas.microsoft.com/office/powerpoint/2010/main" spd="slow" p14:dur="2000">
         <p159:morph option="byObject"/>
       </p:transition>
     </mc:Choice>
-    <mc:Fallback>
+    <mc:Fallback xmlns="">
       <p:transition spd="slow">
         <p:fade/>
       </p:transition>
@@ -3982,13 +3987,13 @@
   <p:clrMapOvr>
     <a:masterClrMapping/>
   </p:clrMapOvr>
-  <mc:AlternateContent xmlns:mc="http://schemas.openxmlformats.org/markup-compatibility/2006">
-    <mc:Choice xmlns:p159="http://schemas.microsoft.com/office/powerpoint/2015/09/main" Requires="p159">
+  <mc:AlternateContent xmlns:mc="http://schemas.openxmlformats.org/markup-compatibility/2006" xmlns:p159="http://schemas.microsoft.com/office/powerpoint/2015/09/main">
+    <mc:Choice Requires="p159">
       <p:transition xmlns:p14="http://schemas.microsoft.com/office/powerpoint/2010/main" spd="slow" p14:dur="2000">
         <p159:morph option="byObject"/>
       </p:transition>
     </mc:Choice>
-    <mc:Fallback>
+    <mc:Fallback xmlns="">
       <p:transition spd="slow">
         <p:fade/>
       </p:transition>
@@ -4115,13 +4120,13 @@
   <p:clrMapOvr>
     <a:masterClrMapping/>
   </p:clrMapOvr>
-  <mc:AlternateContent xmlns:mc="http://schemas.openxmlformats.org/markup-compatibility/2006">
-    <mc:Choice xmlns:p159="http://schemas.microsoft.com/office/powerpoint/2015/09/main" Requires="p159">
+  <mc:AlternateContent xmlns:mc="http://schemas.openxmlformats.org/markup-compatibility/2006" xmlns:p159="http://schemas.microsoft.com/office/powerpoint/2015/09/main">
+    <mc:Choice Requires="p159">
       <p:transition xmlns:p14="http://schemas.microsoft.com/office/powerpoint/2010/main" spd="slow" p14:dur="2000">
         <p159:morph option="byObject"/>
       </p:transition>
     </mc:Choice>
-    <mc:Fallback>
+    <mc:Fallback xmlns="">
       <p:transition spd="slow">
         <p:fade/>
       </p:transition>
@@ -4248,13 +4253,13 @@
   <p:clrMapOvr>
     <a:masterClrMapping/>
   </p:clrMapOvr>
-  <mc:AlternateContent xmlns:mc="http://schemas.openxmlformats.org/markup-compatibility/2006">
-    <mc:Choice xmlns:p159="http://schemas.microsoft.com/office/powerpoint/2015/09/main" Requires="p159">
+  <mc:AlternateContent xmlns:mc="http://schemas.openxmlformats.org/markup-compatibility/2006" xmlns:p159="http://schemas.microsoft.com/office/powerpoint/2015/09/main">
+    <mc:Choice Requires="p159">
       <p:transition xmlns:p14="http://schemas.microsoft.com/office/powerpoint/2010/main" spd="slow" p14:dur="2000">
         <p159:morph option="byObject"/>
       </p:transition>
     </mc:Choice>
-    <mc:Fallback>
+    <mc:Fallback xmlns="">
       <p:transition spd="slow">
         <p:fade/>
       </p:transition>
@@ -4381,13 +4386,13 @@
   <p:clrMapOvr>
     <a:masterClrMapping/>
   </p:clrMapOvr>
-  <mc:AlternateContent xmlns:mc="http://schemas.openxmlformats.org/markup-compatibility/2006">
-    <mc:Choice xmlns:p159="http://schemas.microsoft.com/office/powerpoint/2015/09/main" Requires="p159">
+  <mc:AlternateContent xmlns:mc="http://schemas.openxmlformats.org/markup-compatibility/2006" xmlns:p159="http://schemas.microsoft.com/office/powerpoint/2015/09/main">
+    <mc:Choice Requires="p159">
       <p:transition xmlns:p14="http://schemas.microsoft.com/office/powerpoint/2010/main" spd="slow" p14:dur="2000">
         <p159:morph option="byObject"/>
       </p:transition>
     </mc:Choice>
-    <mc:Fallback>
+    <mc:Fallback xmlns="">
       <p:transition spd="slow">
         <p:fade/>
       </p:transition>

</xml_diff>